<commit_message>
having keyword in stats.Rmd
</commit_message>
<xml_diff>
--- a/src/stats.pptx
+++ b/src/stats.pptx
@@ -5,7 +5,7 @@
     <p:sldMasterId id="2147483648" r:id="rId1"/>
   </p:sldMasterIdLst>
   <p:notesMasterIdLst>
-    <p:NotesMasterId r:id="rId21"/>
+    <p:NotesMasterId r:id="rId20"/>
   </p:notesMasterIdLst>
   <p:sldIdLst>
     <p:sldId id="256" r:id="rId2"/>
@@ -26,7 +26,6 @@
     <p:sldId id="271" r:id="rId17"/>
     <p:sldId id="272" r:id="rId18"/>
     <p:sldId id="273" r:id="rId19"/>
-    <p:sldId id="274" r:id="rId20"/>
   </p:sldIdLst>
   <p:sldSz cx="9144000" cy="6858000" type="screen4x3"/>
   <p:notesSz cx="6858000" cy="9144000"/>
@@ -2625,23 +2624,103 @@
             </a:pPr>
             <a:r>
               <a:rPr/>
-              <a:t>The</a:t>
-            </a:r>
-            <a:r>
-              <a:rPr/>
-              <a:t> </a:t>
-            </a:r>
-            <a:r>
-              <a:rPr/>
-              <a:t>average</a:t>
-            </a:r>
-            <a:r>
-              <a:rPr/>
-              <a:t> </a:t>
-            </a:r>
-            <a:r>
-              <a:rPr/>
-              <a:t>function</a:t>
+              <a:t>You</a:t>
+            </a:r>
+            <a:r>
+              <a:rPr/>
+              <a:t> </a:t>
+            </a:r>
+            <a:r>
+              <a:rPr/>
+              <a:t>can</a:t>
+            </a:r>
+            <a:r>
+              <a:rPr/>
+              <a:t> </a:t>
+            </a:r>
+            <a:r>
+              <a:rPr/>
+              <a:t>put</a:t>
+            </a:r>
+            <a:r>
+              <a:rPr/>
+              <a:t> </a:t>
+            </a:r>
+            <a:r>
+              <a:rPr/>
+              <a:t>two</a:t>
+            </a:r>
+            <a:r>
+              <a:rPr/>
+              <a:t> </a:t>
+            </a:r>
+            <a:r>
+              <a:rPr/>
+              <a:t>or</a:t>
+            </a:r>
+            <a:r>
+              <a:rPr/>
+              <a:t> </a:t>
+            </a:r>
+            <a:r>
+              <a:rPr/>
+              <a:t>more</a:t>
+            </a:r>
+            <a:r>
+              <a:rPr/>
+              <a:t> </a:t>
+            </a:r>
+            <a:r>
+              <a:rPr/>
+              <a:t>categorical</a:t>
+            </a:r>
+            <a:r>
+              <a:rPr/>
+              <a:t> </a:t>
+            </a:r>
+            <a:r>
+              <a:rPr/>
+              <a:t>variables</a:t>
+            </a:r>
+            <a:r>
+              <a:rPr/>
+              <a:t> </a:t>
+            </a:r>
+            <a:r>
+              <a:rPr/>
+              <a:t>in</a:t>
+            </a:r>
+            <a:r>
+              <a:rPr/>
+              <a:t> </a:t>
+            </a:r>
+            <a:r>
+              <a:rPr/>
+              <a:t>the</a:t>
+            </a:r>
+            <a:r>
+              <a:rPr/>
+              <a:t> </a:t>
+            </a:r>
+            <a:r>
+              <a:rPr/>
+              <a:t>GROUP</a:t>
+            </a:r>
+            <a:r>
+              <a:rPr/>
+              <a:t> </a:t>
+            </a:r>
+            <a:r>
+              <a:rPr/>
+              <a:t>BY</a:t>
+            </a:r>
+            <a:r>
+              <a:rPr/>
+              <a:t> </a:t>
+            </a:r>
+            <a:r>
+              <a:rPr/>
+              <a:t>statement.</a:t>
             </a:r>
           </a:p>
         </p:txBody>
@@ -2663,7 +2742,7 @@
           <a:p>
             <a:fld id="{18BDFEC3-8487-43E8-A154-7C12CBC1FFF2}" type="slidenum">
               <a:rPr lang="en-US"/>
-              <a:t>18</a:t>
+              <a:t>16</a:t>
             </a:fld>
             <a:endParaRPr lang="en-US"/>
           </a:p>
@@ -2723,15 +2802,71 @@
             </a:pPr>
             <a:r>
               <a:rPr/>
-              <a:t>Here’s</a:t>
-            </a:r>
-            <a:r>
-              <a:rPr/>
-              <a:t> </a:t>
-            </a:r>
-            <a:r>
-              <a:rPr/>
-              <a:t>what</a:t>
+              <a:t>If</a:t>
+            </a:r>
+            <a:r>
+              <a:rPr/>
+              <a:t> </a:t>
+            </a:r>
+            <a:r>
+              <a:rPr/>
+              <a:t>you</a:t>
+            </a:r>
+            <a:r>
+              <a:rPr/>
+              <a:t> </a:t>
+            </a:r>
+            <a:r>
+              <a:rPr/>
+              <a:t>want</a:t>
+            </a:r>
+            <a:r>
+              <a:rPr/>
+              <a:t> </a:t>
+            </a:r>
+            <a:r>
+              <a:rPr/>
+              <a:t>to</a:t>
+            </a:r>
+            <a:r>
+              <a:rPr/>
+              <a:t> </a:t>
+            </a:r>
+            <a:r>
+              <a:rPr/>
+              <a:t>filter</a:t>
+            </a:r>
+            <a:r>
+              <a:rPr/>
+              <a:t> </a:t>
+            </a:r>
+            <a:r>
+              <a:rPr/>
+              <a:t>on</a:t>
+            </a:r>
+            <a:r>
+              <a:rPr/>
+              <a:t> </a:t>
+            </a:r>
+            <a:r>
+              <a:rPr/>
+              <a:t>a</a:t>
+            </a:r>
+            <a:r>
+              <a:rPr/>
+              <a:t> </a:t>
+            </a:r>
+            <a:r>
+              <a:rPr/>
+              <a:t>value</a:t>
+            </a:r>
+            <a:r>
+              <a:rPr/>
+              <a:t> </a:t>
+            </a:r>
+            <a:r>
+              <a:rPr/>
+              <a:t>of</a:t>
             </a:r>
             <a:r>
               <a:rPr/>
@@ -2747,23 +2882,359 @@
             </a:r>
             <a:r>
               <a:rPr/>
-              <a:t>results</a:t>
-            </a:r>
-            <a:r>
-              <a:rPr/>
-              <a:t> </a:t>
-            </a:r>
-            <a:r>
-              <a:rPr/>
-              <a:t>looks</a:t>
-            </a:r>
-            <a:r>
-              <a:rPr/>
-              <a:t> </a:t>
-            </a:r>
-            <a:r>
-              <a:rPr/>
-              <a:t>like.</a:t>
+              <a:t>summary</a:t>
+            </a:r>
+            <a:r>
+              <a:rPr/>
+              <a:t> </a:t>
+            </a:r>
+            <a:r>
+              <a:rPr/>
+              <a:t>statistic,</a:t>
+            </a:r>
+            <a:r>
+              <a:rPr/>
+              <a:t> </a:t>
+            </a:r>
+            <a:r>
+              <a:rPr/>
+              <a:t>you</a:t>
+            </a:r>
+            <a:r>
+              <a:rPr/>
+              <a:t> </a:t>
+            </a:r>
+            <a:r>
+              <a:rPr/>
+              <a:t>need</a:t>
+            </a:r>
+            <a:r>
+              <a:rPr/>
+              <a:t> </a:t>
+            </a:r>
+            <a:r>
+              <a:rPr/>
+              <a:t>to</a:t>
+            </a:r>
+            <a:r>
+              <a:rPr/>
+              <a:t> </a:t>
+            </a:r>
+            <a:r>
+              <a:rPr/>
+              <a:t>use</a:t>
+            </a:r>
+            <a:r>
+              <a:rPr/>
+              <a:t> </a:t>
+            </a:r>
+            <a:r>
+              <a:rPr/>
+              <a:t>the</a:t>
+            </a:r>
+            <a:r>
+              <a:rPr/>
+              <a:t> </a:t>
+            </a:r>
+            <a:r>
+              <a:rPr/>
+              <a:t>having</a:t>
+            </a:r>
+            <a:r>
+              <a:rPr/>
+              <a:t> </a:t>
+            </a:r>
+            <a:r>
+              <a:rPr/>
+              <a:t>keyword.</a:t>
+            </a:r>
+            <a:r>
+              <a:rPr/>
+              <a:t> </a:t>
+            </a:r>
+            <a:r>
+              <a:rPr/>
+              <a:t>This</a:t>
+            </a:r>
+            <a:r>
+              <a:rPr/>
+              <a:t> </a:t>
+            </a:r>
+            <a:r>
+              <a:rPr/>
+              <a:t>code</a:t>
+            </a:r>
+            <a:r>
+              <a:rPr/>
+              <a:t> </a:t>
+            </a:r>
+            <a:r>
+              <a:rPr/>
+              <a:t>selects</a:t>
+            </a:r>
+            <a:r>
+              <a:rPr/>
+              <a:t> </a:t>
+            </a:r>
+            <a:r>
+              <a:rPr/>
+              <a:t>those</a:t>
+            </a:r>
+            <a:r>
+              <a:rPr/>
+              <a:t> </a:t>
+            </a:r>
+            <a:r>
+              <a:rPr/>
+              <a:t>ages</a:t>
+            </a:r>
+            <a:r>
+              <a:rPr/>
+              <a:t> </a:t>
+            </a:r>
+            <a:r>
+              <a:rPr/>
+              <a:t>with</a:t>
+            </a:r>
+            <a:r>
+              <a:rPr/>
+              <a:t> </a:t>
+            </a:r>
+            <a:r>
+              <a:rPr/>
+              <a:t>only</a:t>
+            </a:r>
+            <a:r>
+              <a:rPr/>
+              <a:t> </a:t>
+            </a:r>
+            <a:r>
+              <a:rPr/>
+              <a:t>one</a:t>
+            </a:r>
+            <a:r>
+              <a:rPr/>
+              <a:t> </a:t>
+            </a:r>
+            <a:r>
+              <a:rPr/>
+              <a:t>passenger.</a:t>
+            </a:r>
+            <a:r>
+              <a:rPr/>
+              <a:t> </a:t>
+            </a:r>
+            <a:r>
+              <a:rPr/>
+              <a:t>You</a:t>
+            </a:r>
+            <a:r>
+              <a:rPr/>
+              <a:t> </a:t>
+            </a:r>
+            <a:r>
+              <a:rPr/>
+              <a:t>cannot</a:t>
+            </a:r>
+            <a:r>
+              <a:rPr/>
+              <a:t> </a:t>
+            </a:r>
+            <a:r>
+              <a:rPr/>
+              <a:t>use</a:t>
+            </a:r>
+            <a:r>
+              <a:rPr/>
+              <a:t> </a:t>
+            </a:r>
+            <a:r>
+              <a:rPr/>
+              <a:t>the</a:t>
+            </a:r>
+            <a:r>
+              <a:rPr/>
+              <a:t> </a:t>
+            </a:r>
+            <a:r>
+              <a:rPr/>
+              <a:t>where</a:t>
+            </a:r>
+            <a:r>
+              <a:rPr/>
+              <a:t> </a:t>
+            </a:r>
+            <a:r>
+              <a:rPr/>
+              <a:t>keyword</a:t>
+            </a:r>
+            <a:r>
+              <a:rPr/>
+              <a:t> </a:t>
+            </a:r>
+            <a:r>
+              <a:rPr/>
+              <a:t>because</a:t>
+            </a:r>
+            <a:r>
+              <a:rPr/>
+              <a:t> </a:t>
+            </a:r>
+            <a:r>
+              <a:rPr/>
+              <a:t>where</a:t>
+            </a:r>
+            <a:r>
+              <a:rPr/>
+              <a:t> </a:t>
+            </a:r>
+            <a:r>
+              <a:rPr/>
+              <a:t>is</a:t>
+            </a:r>
+            <a:r>
+              <a:rPr/>
+              <a:t> </a:t>
+            </a:r>
+            <a:r>
+              <a:rPr/>
+              <a:t>run</a:t>
+            </a:r>
+            <a:r>
+              <a:rPr/>
+              <a:t> </a:t>
+            </a:r>
+            <a:r>
+              <a:rPr/>
+              <a:t>BEFORE</a:t>
+            </a:r>
+            <a:r>
+              <a:rPr/>
+              <a:t> </a:t>
+            </a:r>
+            <a:r>
+              <a:rPr/>
+              <a:t>the</a:t>
+            </a:r>
+            <a:r>
+              <a:rPr/>
+              <a:t> </a:t>
+            </a:r>
+            <a:r>
+              <a:rPr/>
+              <a:t>data</a:t>
+            </a:r>
+            <a:r>
+              <a:rPr/>
+              <a:t> </a:t>
+            </a:r>
+            <a:r>
+              <a:rPr/>
+              <a:t>is</a:t>
+            </a:r>
+            <a:r>
+              <a:rPr/>
+              <a:t> </a:t>
+            </a:r>
+            <a:r>
+              <a:rPr/>
+              <a:t>summarized.</a:t>
+            </a:r>
+            <a:r>
+              <a:rPr/>
+              <a:t> </a:t>
+            </a:r>
+            <a:r>
+              <a:rPr/>
+              <a:t>You</a:t>
+            </a:r>
+            <a:r>
+              <a:rPr/>
+              <a:t> </a:t>
+            </a:r>
+            <a:r>
+              <a:rPr/>
+              <a:t>use</a:t>
+            </a:r>
+            <a:r>
+              <a:rPr/>
+              <a:t> </a:t>
+            </a:r>
+            <a:r>
+              <a:rPr/>
+              <a:t>the</a:t>
+            </a:r>
+            <a:r>
+              <a:rPr/>
+              <a:t> </a:t>
+            </a:r>
+            <a:r>
+              <a:rPr/>
+              <a:t>having</a:t>
+            </a:r>
+            <a:r>
+              <a:rPr/>
+              <a:t> </a:t>
+            </a:r>
+            <a:r>
+              <a:rPr/>
+              <a:t>keyword</a:t>
+            </a:r>
+            <a:r>
+              <a:rPr/>
+              <a:t> </a:t>
+            </a:r>
+            <a:r>
+              <a:rPr/>
+              <a:t>to</a:t>
+            </a:r>
+            <a:r>
+              <a:rPr/>
+              <a:t> </a:t>
+            </a:r>
+            <a:r>
+              <a:rPr/>
+              <a:t>filter</a:t>
+            </a:r>
+            <a:r>
+              <a:rPr/>
+              <a:t> </a:t>
+            </a:r>
+            <a:r>
+              <a:rPr/>
+              <a:t>AFTER</a:t>
+            </a:r>
+            <a:r>
+              <a:rPr/>
+              <a:t> </a:t>
+            </a:r>
+            <a:r>
+              <a:rPr/>
+              <a:t>the</a:t>
+            </a:r>
+            <a:r>
+              <a:rPr/>
+              <a:t> </a:t>
+            </a:r>
+            <a:r>
+              <a:rPr/>
+              <a:t>data</a:t>
+            </a:r>
+            <a:r>
+              <a:rPr/>
+              <a:t> </a:t>
+            </a:r>
+            <a:r>
+              <a:rPr/>
+              <a:t>is</a:t>
+            </a:r>
+            <a:r>
+              <a:rPr/>
+              <a:t> </a:t>
+            </a:r>
+            <a:r>
+              <a:rPr/>
+              <a:t>summarized.</a:t>
             </a:r>
           </a:p>
         </p:txBody>
@@ -2785,7 +3256,153 @@
           <a:p>
             <a:fld id="{18BDFEC3-8487-43E8-A154-7C12CBC1FFF2}" type="slidenum">
               <a:rPr lang="en-US"/>
-              <a:t>19</a:t>
+              <a:t>17</a:t>
+            </a:fld>
+            <a:endParaRPr lang="en-US"/>
+          </a:p>
+        </p:txBody>
+      </p:sp>
+    </p:spTree>
+  </p:cSld>
+</p:notes>
+</file>
+
+<file path=ppt/notesSlides/notesSlide16.xml><?xml version="1.0" encoding="utf-8"?>
+<p:notes xmlns:a="http://schemas.openxmlformats.org/drawingml/2006/main" xmlns:r="http://schemas.openxmlformats.org/officeDocument/2006/relationships" xmlns:p="http://schemas.openxmlformats.org/presentationml/2006/main">
+  <p:cSld>
+    <p:spTree>
+      <p:nvGrpSpPr>
+        <p:cNvPr id="1" name=""/>
+        <p:cNvGrpSpPr/>
+        <p:nvPr/>
+      </p:nvGrpSpPr>
+      <p:grpSpPr>
+        <a:xfrm>
+          <a:off x="0" y="0"/>
+          <a:ext cx="0" cy="0"/>
+          <a:chOff x="0" y="0"/>
+          <a:chExt cx="0" cy="0"/>
+        </a:xfrm>
+      </p:grpSpPr>
+      <p:sp>
+        <p:nvSpPr>
+          <p:cNvPr id="2" name="Slide Image Placeholder 1"/>
+          <p:cNvSpPr>
+            <a:spLocks noGrp="1" noRot="1" noChangeAspect="1"/>
+          </p:cNvSpPr>
+          <p:nvPr>
+            <p:ph type="sldImg"/>
+          </p:nvPr>
+        </p:nvSpPr>
+        <p:spPr/>
+      </p:sp>
+      <p:sp>
+        <p:nvSpPr>
+          <p:cNvPr id="3" name="Notes Placeholder 2"/>
+          <p:cNvSpPr>
+            <a:spLocks noGrp="1"/>
+          </p:cNvSpPr>
+          <p:nvPr>
+            <p:ph type="body" idx="1"/>
+          </p:nvPr>
+        </p:nvSpPr>
+        <p:spPr/>
+        <p:txBody>
+          <a:bodyPr/>
+          <a:lstStyle/>
+          <a:p>
+            <a:pPr lvl="0" marL="0" indent="0">
+              <a:buNone/>
+            </a:pPr>
+            <a:r>
+              <a:rPr/>
+              <a:t>Here’s</a:t>
+            </a:r>
+            <a:r>
+              <a:rPr/>
+              <a:t> </a:t>
+            </a:r>
+            <a:r>
+              <a:rPr/>
+              <a:t>another</a:t>
+            </a:r>
+            <a:r>
+              <a:rPr/>
+              <a:t> </a:t>
+            </a:r>
+            <a:r>
+              <a:rPr/>
+              <a:t>example.</a:t>
+            </a:r>
+            <a:r>
+              <a:rPr/>
+              <a:t> </a:t>
+            </a:r>
+            <a:r>
+              <a:rPr/>
+              <a:t>You</a:t>
+            </a:r>
+            <a:r>
+              <a:rPr/>
+              <a:t> </a:t>
+            </a:r>
+            <a:r>
+              <a:rPr/>
+              <a:t>are</a:t>
+            </a:r>
+            <a:r>
+              <a:rPr/>
+              <a:t> </a:t>
+            </a:r>
+            <a:r>
+              <a:rPr/>
+              <a:t>selecting</a:t>
+            </a:r>
+            <a:r>
+              <a:rPr/>
+              <a:t> </a:t>
+            </a:r>
+            <a:r>
+              <a:rPr/>
+              <a:t>only</a:t>
+            </a:r>
+            <a:r>
+              <a:rPr/>
+              <a:t> </a:t>
+            </a:r>
+            <a:r>
+              <a:rPr/>
+              <a:t>female</a:t>
+            </a:r>
+            <a:r>
+              <a:rPr/>
+              <a:t> </a:t>
+            </a:r>
+            <a:r>
+              <a:rPr/>
+              <a:t>passengers.</a:t>
+            </a:r>
+          </a:p>
+        </p:txBody>
+      </p:sp>
+      <p:sp>
+        <p:nvSpPr>
+          <p:cNvPr id="4" name="Slide Number Placeholder 3"/>
+          <p:cNvSpPr>
+            <a:spLocks noGrp="1"/>
+          </p:cNvSpPr>
+          <p:nvPr>
+            <p:ph type="sldNum" sz="quarter" idx="10"/>
+          </p:nvPr>
+        </p:nvSpPr>
+        <p:spPr/>
+        <p:txBody>
+          <a:bodyPr/>
+          <a:lstStyle/>
+          <a:p>
+            <a:fld id="{18BDFEC3-8487-43E8-A154-7C12CBC1FFF2}" type="slidenum">
+              <a:rPr lang="en-US"/>
+              <a:t>18</a:t>
             </a:fld>
             <a:endParaRPr lang="en-US"/>
           </a:p>
@@ -12689,15 +13306,6 @@
           <a:bodyPr/>
           <a:lstStyle/>
           <a:p>
-            <a:pPr lvl="0" marL="0" indent="0">
-              <a:buNone/>
-            </a:pPr>
-            <a:r>
-              <a:rPr/>
-              <a:t>You can put two or more categorical variables in the GROUP BY statement.</a:t>
-            </a:r>
-          </a:p>
-          <a:p>
             <a:pPr lvl="1"/>
             <a:r>
               <a:rPr/>
@@ -12785,39 +13393,23 @@
             </a:pPr>
             <a:r>
               <a:rPr/>
-              <a:t>Description</a:t>
-            </a:r>
-            <a:r>
-              <a:rPr/>
-              <a:t> </a:t>
-            </a:r>
-            <a:r>
-              <a:rPr/>
-              <a:t>of</a:t>
-            </a:r>
-            <a:r>
-              <a:rPr/>
-              <a:t> </a:t>
-            </a:r>
-            <a:r>
-              <a:rPr/>
-              <a:t>the</a:t>
-            </a:r>
-            <a:r>
-              <a:rPr/>
-              <a:t> </a:t>
-            </a:r>
-            <a:r>
-              <a:rPr/>
-              <a:t>Titanic</a:t>
-            </a:r>
-            <a:r>
-              <a:rPr/>
-              <a:t> </a:t>
-            </a:r>
-            <a:r>
-              <a:rPr/>
-              <a:t>database</a:t>
+              <a:t>The</a:t>
+            </a:r>
+            <a:r>
+              <a:rPr/>
+              <a:t> </a:t>
+            </a:r>
+            <a:r>
+              <a:rPr/>
+              <a:t>having</a:t>
+            </a:r>
+            <a:r>
+              <a:rPr/>
+              <a:t> </a:t>
+            </a:r>
+            <a:r>
+              <a:rPr/>
+              <a:t>keyword</a:t>
             </a:r>
           </a:p>
         </p:txBody>
@@ -12840,7 +13432,43 @@
             <a:pPr lvl="1"/>
             <a:r>
               <a:rPr/>
-              <a:t>The Titanic database</a:t>
+              <a:t>SQL code</a:t>
+            </a:r>
+          </a:p>
+          <a:p>
+            <a:pPr lvl="0" marL="1270000" indent="0">
+              <a:buNone/>
+            </a:pPr>
+            <a:r>
+              <a:rPr sz="1800">
+                <a:latin typeface="Courier"/>
+              </a:rPr>
+              <a:t>select Age, count(Age) as n
+  from titanic_table
+  group by Age
+  having n &gt;= 30</a:t>
+            </a:r>
+          </a:p>
+          <a:p>
+            <a:pPr lvl="1"/>
+            <a:r>
+              <a:rPr/>
+              <a:t>SQL output</a:t>
+            </a:r>
+          </a:p>
+          <a:p>
+            <a:pPr lvl="0" marL="1270000" indent="0">
+              <a:buNone/>
+            </a:pPr>
+            <a:r>
+              <a:rPr sz="1800">
+                <a:latin typeface="Courier"/>
+              </a:rPr>
+              <a:t>  Age  n
+1  18 30
+2  21 31
+3  22 35
+4  30 31</a:t>
             </a:r>
           </a:p>
         </p:txBody>
@@ -12887,55 +13515,31 @@
             </a:pPr>
             <a:r>
               <a:rPr/>
-              <a:t>Computing</a:t>
-            </a:r>
-            <a:r>
-              <a:rPr/>
-              <a:t> </a:t>
-            </a:r>
-            <a:r>
-              <a:rPr/>
-              <a:t>the</a:t>
-            </a:r>
-            <a:r>
-              <a:rPr/>
-              <a:t> </a:t>
-            </a:r>
-            <a:r>
-              <a:rPr/>
-              <a:t>average</a:t>
-            </a:r>
-            <a:r>
-              <a:rPr/>
-              <a:t> </a:t>
-            </a:r>
-            <a:r>
-              <a:rPr/>
-              <a:t>age</a:t>
-            </a:r>
-            <a:r>
-              <a:rPr/>
-              <a:t> </a:t>
-            </a:r>
-            <a:r>
-              <a:rPr/>
-              <a:t>of</a:t>
-            </a:r>
-            <a:r>
-              <a:rPr/>
-              <a:t> </a:t>
-            </a:r>
-            <a:r>
-              <a:rPr/>
-              <a:t>all</a:t>
-            </a:r>
-            <a:r>
-              <a:rPr/>
-              <a:t> </a:t>
-            </a:r>
-            <a:r>
-              <a:rPr/>
-              <a:t>passengers</a:t>
+              <a:t>The</a:t>
+            </a:r>
+            <a:r>
+              <a:rPr/>
+              <a:t> </a:t>
+            </a:r>
+            <a:r>
+              <a:rPr/>
+              <a:t>having</a:t>
+            </a:r>
+            <a:r>
+              <a:rPr/>
+              <a:t> </a:t>
+            </a:r>
+            <a:r>
+              <a:rPr/>
+              <a:t>keyword</a:t>
+            </a:r>
+            <a:r>
+              <a:rPr/>
+              <a:t> </a:t>
+            </a:r>
+            <a:r>
+              <a:rPr/>
+              <a:t>(2/2)</a:t>
             </a:r>
           </a:p>
         </p:txBody>
@@ -12969,121 +13573,20 @@
               <a:rPr sz="1800">
                 <a:latin typeface="Courier"/>
               </a:rPr>
-              <a:t>select average(age) 
-  from titanic</a:t>
-            </a:r>
-          </a:p>
-        </p:txBody>
-      </p:sp>
-    </p:spTree>
-  </p:cSld>
-</p:sld>
-</file>
-
-<file path=ppt/slides/slide19.xml><?xml version="1.0" encoding="utf-8"?>
-<p:sld xmlns:a="http://schemas.openxmlformats.org/drawingml/2006/main" xmlns:r="http://schemas.openxmlformats.org/officeDocument/2006/relationships" xmlns:p="http://schemas.openxmlformats.org/presentationml/2006/main">
-  <p:cSld>
-    <p:spTree>
-      <p:nvGrpSpPr>
-        <p:cNvPr id="1" name=""/>
-        <p:cNvGrpSpPr/>
-        <p:nvPr/>
-      </p:nvGrpSpPr>
-      <p:grpSpPr>
-        <a:xfrm>
-          <a:off x="0" y="0"/>
-          <a:ext cx="0" cy="0"/>
-          <a:chOff x="0" y="0"/>
-          <a:chExt cx="0" cy="0"/>
-        </a:xfrm>
-      </p:grpSpPr>
-      <p:sp>
-        <p:nvSpPr>
-          <p:cNvPr id="2" name="Title 1"/>
-          <p:cNvSpPr>
-            <a:spLocks noGrp="1"/>
-          </p:cNvSpPr>
-          <p:nvPr>
-            <p:ph type="title"/>
-          </p:nvPr>
-        </p:nvSpPr>
-        <p:spPr/>
-        <p:txBody>
-          <a:bodyPr/>
-          <a:lstStyle/>
-          <a:p>
-            <a:pPr lvl="0" marL="0" indent="0">
-              <a:buNone/>
-            </a:pPr>
-            <a:r>
-              <a:rPr/>
-              <a:t>Selecting</a:t>
-            </a:r>
-            <a:r>
-              <a:rPr/>
-              <a:t> </a:t>
-            </a:r>
-            <a:r>
-              <a:rPr/>
-              <a:t>a</a:t>
-            </a:r>
-            <a:r>
-              <a:rPr/>
-              <a:t> </a:t>
-            </a:r>
-            <a:r>
-              <a:rPr/>
-              <a:t>limited</a:t>
-            </a:r>
-            <a:r>
-              <a:rPr/>
-              <a:t> </a:t>
-            </a:r>
-            <a:r>
-              <a:rPr/>
-              <a:t>number</a:t>
-            </a:r>
-            <a:r>
-              <a:rPr/>
-              <a:t> </a:t>
-            </a:r>
-            <a:r>
-              <a:rPr/>
-              <a:t>of</a:t>
-            </a:r>
-            <a:r>
-              <a:rPr/>
-              <a:t> </a:t>
-            </a:r>
-            <a:r>
-              <a:rPr/>
-              <a:t>records</a:t>
-            </a:r>
-            <a:r>
-              <a:rPr/>
-              <a:t> </a:t>
-            </a:r>
-            <a:r>
-              <a:rPr/>
-              <a:t>(2/2)</a:t>
-            </a:r>
-          </a:p>
-        </p:txBody>
-      </p:sp>
-      <p:sp>
-        <p:nvSpPr>
-          <p:cNvPr id="3" name="Content Placeholder 2"/>
-          <p:cNvSpPr>
-            <a:spLocks noGrp="1"/>
-          </p:cNvSpPr>
-          <p:nvPr>
-            <p:ph idx="1"/>
-          </p:nvPr>
-        </p:nvSpPr>
-        <p:spPr/>
-        <p:txBody>
-          <a:bodyPr/>
-          <a:lstStyle/>
+              <a:t>select PClass, min(Age) as youngest_female
+  from titanic_table
+  where Sex='female'
+  group by PClass
+  having youngest_female &lt; 1</a:t>
+            </a:r>
+          </a:p>
+          <a:p>
+            <a:pPr lvl="1"/>
+            <a:r>
+              <a:rPr/>
+              <a:t>SQL output</a:t>
+            </a:r>
+          </a:p>
           <a:p>
             <a:pPr lvl="0" marL="1270000" indent="0">
               <a:buNone/>
@@ -13092,8 +13595,8 @@
               <a:rPr sz="1800">
                 <a:latin typeface="Courier"/>
               </a:rPr>
-              <a:t>  avg(age)
-1 30.39799</a:t>
+              <a:t>  PClass youngest_female
+1    3rd            0.17</a:t>
             </a:r>
           </a:p>
         </p:txBody>

</xml_diff>